<commit_message>
I broke down and made a score screen for Boggle.
</commit_message>
<xml_diff>
--- a/UNM/CS351/BoggleLab/doc/Boggle Design Diagram.pptx
+++ b/UNM/CS351/BoggleLab/doc/Boggle Design Diagram.pptx
@@ -289,7 +289,7 @@
           <a:p>
             <a:fld id="{95BA4CF9-B78C-45B4-9A3B-73F055770954}" type="datetimeFigureOut">
               <a:rPr lang="en-US" smtClean="0"/>
-              <a:t>9/28/2017</a:t>
+              <a:t>10/7/2017</a:t>
             </a:fld>
             <a:endParaRPr lang="en-US"/>
           </a:p>
@@ -459,7 +459,7 @@
           <a:p>
             <a:fld id="{95BA4CF9-B78C-45B4-9A3B-73F055770954}" type="datetimeFigureOut">
               <a:rPr lang="en-US" smtClean="0"/>
-              <a:t>9/28/2017</a:t>
+              <a:t>10/7/2017</a:t>
             </a:fld>
             <a:endParaRPr lang="en-US"/>
           </a:p>
@@ -639,7 +639,7 @@
           <a:p>
             <a:fld id="{95BA4CF9-B78C-45B4-9A3B-73F055770954}" type="datetimeFigureOut">
               <a:rPr lang="en-US" smtClean="0"/>
-              <a:t>9/28/2017</a:t>
+              <a:t>10/7/2017</a:t>
             </a:fld>
             <a:endParaRPr lang="en-US"/>
           </a:p>
@@ -809,7 +809,7 @@
           <a:p>
             <a:fld id="{95BA4CF9-B78C-45B4-9A3B-73F055770954}" type="datetimeFigureOut">
               <a:rPr lang="en-US" smtClean="0"/>
-              <a:t>9/28/2017</a:t>
+              <a:t>10/7/2017</a:t>
             </a:fld>
             <a:endParaRPr lang="en-US"/>
           </a:p>
@@ -1055,7 +1055,7 @@
           <a:p>
             <a:fld id="{95BA4CF9-B78C-45B4-9A3B-73F055770954}" type="datetimeFigureOut">
               <a:rPr lang="en-US" smtClean="0"/>
-              <a:t>9/28/2017</a:t>
+              <a:t>10/7/2017</a:t>
             </a:fld>
             <a:endParaRPr lang="en-US"/>
           </a:p>
@@ -1343,7 +1343,7 @@
           <a:p>
             <a:fld id="{95BA4CF9-B78C-45B4-9A3B-73F055770954}" type="datetimeFigureOut">
               <a:rPr lang="en-US" smtClean="0"/>
-              <a:t>9/28/2017</a:t>
+              <a:t>10/7/2017</a:t>
             </a:fld>
             <a:endParaRPr lang="en-US"/>
           </a:p>
@@ -1765,7 +1765,7 @@
           <a:p>
             <a:fld id="{95BA4CF9-B78C-45B4-9A3B-73F055770954}" type="datetimeFigureOut">
               <a:rPr lang="en-US" smtClean="0"/>
-              <a:t>9/28/2017</a:t>
+              <a:t>10/7/2017</a:t>
             </a:fld>
             <a:endParaRPr lang="en-US"/>
           </a:p>
@@ -1883,7 +1883,7 @@
           <a:p>
             <a:fld id="{95BA4CF9-B78C-45B4-9A3B-73F055770954}" type="datetimeFigureOut">
               <a:rPr lang="en-US" smtClean="0"/>
-              <a:t>9/28/2017</a:t>
+              <a:t>10/7/2017</a:t>
             </a:fld>
             <a:endParaRPr lang="en-US"/>
           </a:p>
@@ -1978,7 +1978,7 @@
           <a:p>
             <a:fld id="{95BA4CF9-B78C-45B4-9A3B-73F055770954}" type="datetimeFigureOut">
               <a:rPr lang="en-US" smtClean="0"/>
-              <a:t>9/28/2017</a:t>
+              <a:t>10/7/2017</a:t>
             </a:fld>
             <a:endParaRPr lang="en-US"/>
           </a:p>
@@ -2255,7 +2255,7 @@
           <a:p>
             <a:fld id="{95BA4CF9-B78C-45B4-9A3B-73F055770954}" type="datetimeFigureOut">
               <a:rPr lang="en-US" smtClean="0"/>
-              <a:t>9/28/2017</a:t>
+              <a:t>10/7/2017</a:t>
             </a:fld>
             <a:endParaRPr lang="en-US"/>
           </a:p>
@@ -2508,7 +2508,7 @@
           <a:p>
             <a:fld id="{95BA4CF9-B78C-45B4-9A3B-73F055770954}" type="datetimeFigureOut">
               <a:rPr lang="en-US" smtClean="0"/>
-              <a:t>9/28/2017</a:t>
+              <a:t>10/7/2017</a:t>
             </a:fld>
             <a:endParaRPr lang="en-US"/>
           </a:p>
@@ -2721,7 +2721,7 @@
           <a:p>
             <a:fld id="{95BA4CF9-B78C-45B4-9A3B-73F055770954}" type="datetimeFigureOut">
               <a:rPr lang="en-US" smtClean="0"/>
-              <a:t>9/28/2017</a:t>
+              <a:t>10/7/2017</a:t>
             </a:fld>
             <a:endParaRPr lang="en-US"/>
           </a:p>
@@ -4104,11 +4104,7 @@
             <a:pPr algn="l"/>
             <a:r>
               <a:rPr lang="en-US" sz="1000" b="1" dirty="0" smtClean="0"/>
-              <a:t>+</a:t>
-            </a:r>
-            <a:r>
-              <a:rPr lang="en-US" sz="1000" b="1" dirty="0" smtClean="0"/>
-              <a:t>start</a:t>
+              <a:t>+start</a:t>
             </a:r>
           </a:p>
           <a:p>
@@ -4429,7 +4425,6 @@
               <a:rPr lang="en-US" sz="1000" b="1" dirty="0" smtClean="0"/>
               <a:t>()</a:t>
             </a:r>
-            <a:endParaRPr lang="en-US" sz="1000" b="1" dirty="0" smtClean="0"/>
           </a:p>
           <a:p>
             <a:endParaRPr lang="en-US" sz="1200" dirty="0" smtClean="0"/>
@@ -4447,7 +4442,7 @@
         <p:spPr>
           <a:xfrm>
             <a:off x="3807033" y="12944"/>
-            <a:ext cx="1603167" cy="1739656"/>
+            <a:ext cx="1603167" cy="1968256"/>
           </a:xfrm>
           <a:prstGeom prst="rect">
             <a:avLst/>
@@ -4738,6 +4733,21 @@
             <a:r>
               <a:rPr lang="en-US" sz="1000" b="1" dirty="0" err="1" smtClean="0"/>
               <a:t>playSound</a:t>
+            </a:r>
+            <a:r>
+              <a:rPr lang="en-US" sz="1000" b="1" dirty="0" smtClean="0"/>
+              <a:t>()</a:t>
+            </a:r>
+          </a:p>
+          <a:p>
+            <a:pPr algn="l"/>
+            <a:r>
+              <a:rPr lang="en-US" sz="1000" b="1" dirty="0" smtClean="0"/>
+              <a:t>-</a:t>
+            </a:r>
+            <a:r>
+              <a:rPr lang="en-US" sz="1000" b="1" dirty="0" err="1" smtClean="0"/>
+              <a:t>displayEndScreen</a:t>
             </a:r>
             <a:r>
               <a:rPr lang="en-US" sz="1000" b="1" dirty="0" smtClean="0"/>
@@ -4949,7 +4959,6 @@
               <a:rPr lang="en-US" sz="1000" b="1" dirty="0" smtClean="0"/>
               <a:t>()</a:t>
             </a:r>
-            <a:endParaRPr lang="en-US" sz="1000" b="1" dirty="0" smtClean="0"/>
           </a:p>
           <a:p>
             <a:pPr algn="l"/>
@@ -4965,7 +4974,6 @@
               <a:rPr lang="en-US" sz="1000" b="1" dirty="0" smtClean="0"/>
               <a:t>()</a:t>
             </a:r>
-            <a:endParaRPr lang="en-US" sz="1000" b="1" dirty="0" smtClean="0"/>
           </a:p>
           <a:p>
             <a:pPr algn="l"/>
@@ -4981,7 +4989,6 @@
               <a:rPr lang="en-US" sz="1000" b="1" dirty="0" smtClean="0"/>
               <a:t>()</a:t>
             </a:r>
-            <a:endParaRPr lang="en-US" sz="1000" b="1" dirty="0" smtClean="0"/>
           </a:p>
           <a:p>
             <a:pPr algn="l"/>
@@ -5198,7 +5205,6 @@
               <a:rPr lang="en-US" sz="1000" b="1" dirty="0" smtClean="0"/>
               <a:t>()</a:t>
             </a:r>
-            <a:endParaRPr lang="en-US" sz="1000" b="1" dirty="0" smtClean="0"/>
           </a:p>
           <a:p>
             <a:pPr algn="l"/>
@@ -5528,7 +5534,6 @@
               <a:rPr lang="en-US" sz="1000" b="1" dirty="0" smtClean="0"/>
               <a:t>()</a:t>
             </a:r>
-            <a:endParaRPr lang="en-US" sz="1000" b="1" dirty="0" smtClean="0"/>
           </a:p>
           <a:p>
             <a:pPr algn="l"/>
@@ -5654,7 +5659,7 @@
         <p:spPr>
           <a:xfrm flipV="1">
             <a:off x="5410200" y="678726"/>
-            <a:ext cx="838200" cy="204046"/>
+            <a:ext cx="838200" cy="318346"/>
           </a:xfrm>
           <a:prstGeom prst="straightConnector1">
             <a:avLst/>
@@ -5927,9 +5932,10 @@
           </a:lstStyle>
           <a:p>
             <a:r>
-              <a:rPr lang="en-US" sz="1200" b="1" dirty="0" smtClean="0"/>
-              <a:t>Controller</a:t>
-            </a:r>
+              <a:rPr lang="en-US" sz="1200" b="1" dirty="0" err="1" smtClean="0"/>
+              <a:t>BoggleTimer</a:t>
+            </a:r>
+            <a:endParaRPr lang="en-US" sz="1200" b="1" dirty="0" smtClean="0"/>
           </a:p>
           <a:p>
             <a:pPr algn="l"/>
@@ -5984,11 +5990,22 @@
             </a:r>
             <a:r>
               <a:rPr lang="en-US" sz="1000" b="1" dirty="0" err="1" smtClean="0"/>
-              <a:t>pauseTime</a:t>
+              <a:t>pauseTimer</a:t>
+            </a:r>
+            <a:r>
+              <a:rPr lang="en-US" sz="1000" b="1" dirty="0" smtClean="0"/>
+              <a:t>()</a:t>
+            </a:r>
+          </a:p>
+          <a:p>
+            <a:pPr algn="l"/>
+            <a:r>
+              <a:rPr lang="en-US" sz="1000" b="1" dirty="0" smtClean="0"/>
+              <a:t>+</a:t>
             </a:r>
             <a:r>
               <a:rPr lang="en-US" sz="1000" b="1" dirty="0" err="1" smtClean="0"/>
-              <a:t>r</a:t>
+              <a:t>setGameOverEvent</a:t>
             </a:r>
             <a:r>
               <a:rPr lang="en-US" sz="1000" b="1" dirty="0" smtClean="0"/>
@@ -6025,21 +6042,7 @@
               <a:rPr lang="en-US" sz="1000" b="1" dirty="0" smtClean="0"/>
               <a:t>()</a:t>
             </a:r>
-          </a:p>
-          <a:p>
-            <a:pPr algn="l"/>
-            <a:r>
-              <a:rPr lang="en-US" sz="1000" b="1" dirty="0" smtClean="0"/>
-              <a:t>-</a:t>
-            </a:r>
-            <a:r>
-              <a:rPr lang="en-US" sz="1000" b="1" dirty="0" err="1" smtClean="0"/>
-              <a:t>timeUp</a:t>
-            </a:r>
-            <a:r>
-              <a:rPr lang="en-US" sz="1000" b="1" dirty="0" smtClean="0"/>
-              <a:t>()</a:t>
-            </a:r>
+            <a:endParaRPr lang="en-US" sz="1000" b="1" dirty="0" smtClean="0"/>
           </a:p>
           <a:p>
             <a:pPr algn="l"/>
@@ -6055,243 +6058,11 @@
               <a:rPr lang="en-US" sz="1000" b="1" dirty="0" smtClean="0"/>
               <a:t>()</a:t>
             </a:r>
+            <a:endParaRPr lang="en-US" sz="1000" b="1" dirty="0" smtClean="0"/>
           </a:p>
           <a:p>
             <a:pPr algn="l"/>
             <a:endParaRPr lang="en-US" sz="1000" b="1" dirty="0" smtClean="0"/>
-          </a:p>
-          <a:p>
-            <a:endParaRPr lang="en-US" sz="1200" dirty="0" smtClean="0"/>
-          </a:p>
-        </p:txBody>
-      </p:sp>
-      <p:sp>
-        <p:nvSpPr>
-          <p:cNvPr id="36" name="Subtitle 2"/>
-          <p:cNvSpPr txBox="1">
-            <a:spLocks/>
-          </p:cNvSpPr>
-          <p:nvPr/>
-        </p:nvSpPr>
-        <p:spPr>
-          <a:xfrm>
-            <a:off x="3807033" y="2543175"/>
-            <a:ext cx="1295400" cy="847725"/>
-          </a:xfrm>
-          <a:prstGeom prst="rect">
-            <a:avLst/>
-          </a:prstGeom>
-          <a:ln>
-            <a:solidFill>
-              <a:schemeClr val="accent1"/>
-            </a:solidFill>
-          </a:ln>
-        </p:spPr>
-        <p:txBody>
-          <a:bodyPr vert="horz" lIns="91440" tIns="45720" rIns="91440" bIns="45720" rtlCol="0">
-            <a:normAutofit/>
-          </a:bodyPr>
-          <a:lstStyle>
-            <a:lvl1pPr marL="0" indent="0" algn="ctr" defTabSz="914400" rtl="0" eaLnBrk="1" latinLnBrk="0" hangingPunct="1">
-              <a:spcBef>
-                <a:spcPct val="20000"/>
-              </a:spcBef>
-              <a:buFont typeface="Arial" pitchFamily="34" charset="0"/>
-              <a:buNone/>
-              <a:defRPr sz="3200" kern="1200">
-                <a:solidFill>
-                  <a:schemeClr val="tx1">
-                    <a:tint val="75000"/>
-                  </a:schemeClr>
-                </a:solidFill>
-                <a:latin typeface="+mn-lt"/>
-                <a:ea typeface="+mn-ea"/>
-                <a:cs typeface="+mn-cs"/>
-              </a:defRPr>
-            </a:lvl1pPr>
-            <a:lvl2pPr marL="457200" indent="0" algn="ctr" defTabSz="914400" rtl="0" eaLnBrk="1" latinLnBrk="0" hangingPunct="1">
-              <a:spcBef>
-                <a:spcPct val="20000"/>
-              </a:spcBef>
-              <a:buFont typeface="Arial" pitchFamily="34" charset="0"/>
-              <a:buNone/>
-              <a:defRPr sz="2800" kern="1200">
-                <a:solidFill>
-                  <a:schemeClr val="tx1">
-                    <a:tint val="75000"/>
-                  </a:schemeClr>
-                </a:solidFill>
-                <a:latin typeface="+mn-lt"/>
-                <a:ea typeface="+mn-ea"/>
-                <a:cs typeface="+mn-cs"/>
-              </a:defRPr>
-            </a:lvl2pPr>
-            <a:lvl3pPr marL="914400" indent="0" algn="ctr" defTabSz="914400" rtl="0" eaLnBrk="1" latinLnBrk="0" hangingPunct="1">
-              <a:spcBef>
-                <a:spcPct val="20000"/>
-              </a:spcBef>
-              <a:buFont typeface="Arial" pitchFamily="34" charset="0"/>
-              <a:buNone/>
-              <a:defRPr sz="2400" kern="1200">
-                <a:solidFill>
-                  <a:schemeClr val="tx1">
-                    <a:tint val="75000"/>
-                  </a:schemeClr>
-                </a:solidFill>
-                <a:latin typeface="+mn-lt"/>
-                <a:ea typeface="+mn-ea"/>
-                <a:cs typeface="+mn-cs"/>
-              </a:defRPr>
-            </a:lvl3pPr>
-            <a:lvl4pPr marL="1371600" indent="0" algn="ctr" defTabSz="914400" rtl="0" eaLnBrk="1" latinLnBrk="0" hangingPunct="1">
-              <a:spcBef>
-                <a:spcPct val="20000"/>
-              </a:spcBef>
-              <a:buFont typeface="Arial" pitchFamily="34" charset="0"/>
-              <a:buNone/>
-              <a:defRPr sz="2000" kern="1200">
-                <a:solidFill>
-                  <a:schemeClr val="tx1">
-                    <a:tint val="75000"/>
-                  </a:schemeClr>
-                </a:solidFill>
-                <a:latin typeface="+mn-lt"/>
-                <a:ea typeface="+mn-ea"/>
-                <a:cs typeface="+mn-cs"/>
-              </a:defRPr>
-            </a:lvl4pPr>
-            <a:lvl5pPr marL="1828800" indent="0" algn="ctr" defTabSz="914400" rtl="0" eaLnBrk="1" latinLnBrk="0" hangingPunct="1">
-              <a:spcBef>
-                <a:spcPct val="20000"/>
-              </a:spcBef>
-              <a:buFont typeface="Arial" pitchFamily="34" charset="0"/>
-              <a:buNone/>
-              <a:defRPr sz="2000" kern="1200">
-                <a:solidFill>
-                  <a:schemeClr val="tx1">
-                    <a:tint val="75000"/>
-                  </a:schemeClr>
-                </a:solidFill>
-                <a:latin typeface="+mn-lt"/>
-                <a:ea typeface="+mn-ea"/>
-                <a:cs typeface="+mn-cs"/>
-              </a:defRPr>
-            </a:lvl5pPr>
-            <a:lvl6pPr marL="2286000" indent="0" algn="ctr" defTabSz="914400" rtl="0" eaLnBrk="1" latinLnBrk="0" hangingPunct="1">
-              <a:spcBef>
-                <a:spcPct val="20000"/>
-              </a:spcBef>
-              <a:buFont typeface="Arial" pitchFamily="34" charset="0"/>
-              <a:buNone/>
-              <a:defRPr sz="2000" kern="1200">
-                <a:solidFill>
-                  <a:schemeClr val="tx1">
-                    <a:tint val="75000"/>
-                  </a:schemeClr>
-                </a:solidFill>
-                <a:latin typeface="+mn-lt"/>
-                <a:ea typeface="+mn-ea"/>
-                <a:cs typeface="+mn-cs"/>
-              </a:defRPr>
-            </a:lvl6pPr>
-            <a:lvl7pPr marL="2743200" indent="0" algn="ctr" defTabSz="914400" rtl="0" eaLnBrk="1" latinLnBrk="0" hangingPunct="1">
-              <a:spcBef>
-                <a:spcPct val="20000"/>
-              </a:spcBef>
-              <a:buFont typeface="Arial" pitchFamily="34" charset="0"/>
-              <a:buNone/>
-              <a:defRPr sz="2000" kern="1200">
-                <a:solidFill>
-                  <a:schemeClr val="tx1">
-                    <a:tint val="75000"/>
-                  </a:schemeClr>
-                </a:solidFill>
-                <a:latin typeface="+mn-lt"/>
-                <a:ea typeface="+mn-ea"/>
-                <a:cs typeface="+mn-cs"/>
-              </a:defRPr>
-            </a:lvl7pPr>
-            <a:lvl8pPr marL="3200400" indent="0" algn="ctr" defTabSz="914400" rtl="0" eaLnBrk="1" latinLnBrk="0" hangingPunct="1">
-              <a:spcBef>
-                <a:spcPct val="20000"/>
-              </a:spcBef>
-              <a:buFont typeface="Arial" pitchFamily="34" charset="0"/>
-              <a:buNone/>
-              <a:defRPr sz="2000" kern="1200">
-                <a:solidFill>
-                  <a:schemeClr val="tx1">
-                    <a:tint val="75000"/>
-                  </a:schemeClr>
-                </a:solidFill>
-                <a:latin typeface="+mn-lt"/>
-                <a:ea typeface="+mn-ea"/>
-                <a:cs typeface="+mn-cs"/>
-              </a:defRPr>
-            </a:lvl8pPr>
-            <a:lvl9pPr marL="3657600" indent="0" algn="ctr" defTabSz="914400" rtl="0" eaLnBrk="1" latinLnBrk="0" hangingPunct="1">
-              <a:spcBef>
-                <a:spcPct val="20000"/>
-              </a:spcBef>
-              <a:buFont typeface="Arial" pitchFamily="34" charset="0"/>
-              <a:buNone/>
-              <a:defRPr sz="2000" kern="1200">
-                <a:solidFill>
-                  <a:schemeClr val="tx1">
-                    <a:tint val="75000"/>
-                  </a:schemeClr>
-                </a:solidFill>
-                <a:latin typeface="+mn-lt"/>
-                <a:ea typeface="+mn-ea"/>
-                <a:cs typeface="+mn-cs"/>
-              </a:defRPr>
-            </a:lvl9pPr>
-          </a:lstStyle>
-          <a:p>
-            <a:r>
-              <a:rPr lang="en-US" sz="1200" b="1" dirty="0" err="1" smtClean="0"/>
-              <a:t>MutableBoolean</a:t>
-            </a:r>
-            <a:endParaRPr lang="en-US" sz="1200" b="1" dirty="0" smtClean="0"/>
-          </a:p>
-          <a:p>
-            <a:pPr algn="l"/>
-            <a:r>
-              <a:rPr lang="en-US" sz="1000" b="1" dirty="0" smtClean="0"/>
-              <a:t>+</a:t>
-            </a:r>
-            <a:r>
-              <a:rPr lang="en-US" sz="1000" b="1" dirty="0" err="1" smtClean="0"/>
-              <a:t>MutableBoolean</a:t>
-            </a:r>
-            <a:r>
-              <a:rPr lang="en-US" sz="1000" b="1" dirty="0" smtClean="0"/>
-              <a:t>()</a:t>
-            </a:r>
-            <a:endParaRPr lang="en-US" sz="1000" b="1" dirty="0" smtClean="0"/>
-          </a:p>
-          <a:p>
-            <a:pPr algn="l"/>
-            <a:r>
-              <a:rPr lang="en-US" sz="1000" b="1" dirty="0" smtClean="0"/>
-              <a:t>+get()</a:t>
-            </a:r>
-            <a:endParaRPr lang="en-US" sz="1000" b="1" dirty="0" smtClean="0"/>
-          </a:p>
-          <a:p>
-            <a:pPr algn="l"/>
-            <a:r>
-              <a:rPr lang="en-US" sz="1000" b="1" dirty="0" smtClean="0"/>
-              <a:t>+set()</a:t>
-            </a:r>
-            <a:endParaRPr lang="en-US" sz="1000" b="1" dirty="0" smtClean="0"/>
-          </a:p>
-          <a:p>
-            <a:pPr algn="l"/>
-            <a:endParaRPr lang="en-US" sz="1200" b="1" dirty="0" smtClean="0"/>
-          </a:p>
-          <a:p>
-            <a:pPr algn="l"/>
-            <a:endParaRPr lang="en-US" sz="1200" b="1" dirty="0" smtClean="0"/>
           </a:p>
           <a:p>
             <a:endParaRPr lang="en-US" sz="1200" dirty="0" smtClean="0"/>
@@ -6308,7 +6079,7 @@
         </p:nvSpPr>
         <p:spPr>
           <a:xfrm>
-            <a:off x="3807033" y="4038600"/>
+            <a:off x="3657600" y="2590800"/>
             <a:ext cx="1295400" cy="1600200"/>
           </a:xfrm>
           <a:prstGeom prst="rect">
@@ -6500,7 +6271,6 @@
               <a:rPr lang="en-US" sz="1000" b="1" dirty="0" smtClean="0"/>
               <a:t>()</a:t>
             </a:r>
-            <a:endParaRPr lang="en-US" sz="1000" b="1" dirty="0" smtClean="0"/>
           </a:p>
           <a:p>
             <a:pPr algn="l"/>
@@ -6583,7 +6353,6 @@
               <a:rPr lang="en-US" sz="1000" b="1" dirty="0" smtClean="0"/>
               <a:t>()</a:t>
             </a:r>
-            <a:endParaRPr lang="en-US" sz="1000" b="1" dirty="0" smtClean="0"/>
           </a:p>
           <a:p>
             <a:pPr algn="l"/>

</xml_diff>